<commit_message>
Add an template and images to documentation
</commit_message>
<xml_diff>
--- a/Documentation/csci template.pptx
+++ b/Documentation/csci template.pptx
@@ -118,21 +118,8 @@
 <file path=ppt/revisionInfo.xml><?xml version="1.0" encoding="utf-8"?>
 <p1510:revInfo xmlns:a="http://schemas.openxmlformats.org/drawingml/2006/main" xmlns:r="http://schemas.openxmlformats.org/officeDocument/2006/relationships" xmlns:p1510="http://schemas.microsoft.com/office/powerpoint/2015/10/main">
   <p1510:revLst>
-    <p1510:client id="{03AAF230-F303-F82A-B4E6-CB173044280C}" v="2542" dt="2024-04-04T03:07:27.666"/>
-    <p1510:client id="{043F4A73-BEEE-8AE6-EC5B-37F4166B5A2B}" v="17" dt="2024-04-04T05:51:58.967"/>
-    <p1510:client id="{18E1B3B0-0FC0-BB7E-07C2-40D90295EE07}" v="185" dt="2024-04-04T17:41:50.796"/>
-    <p1510:client id="{1B034127-20C1-3C47-E574-952F2EAF51BF}" v="6" dt="2024-04-04T05:49:27.516"/>
-    <p1510:client id="{1D4D10ED-59AB-E3DA-8FCC-D49E8AF55DDB}" v="25" dt="2024-04-04T05:47:23.184"/>
-    <p1510:client id="{4205DC1F-DC03-A734-755B-7C1B95CA7297}" v="99" dt="2024-04-04T04:47:49.097"/>
-    <p1510:client id="{71C97DB7-BD58-11A9-A51D-A31250C588E6}" v="160" dt="2024-04-02T18:59:33.183"/>
-    <p1510:client id="{8090D3FF-3A43-73AC-533B-A201450C1BD1}" v="12" dt="2024-04-03T20:57:27.011"/>
-    <p1510:client id="{88937565-96AE-EFA0-D1CE-675A75DB1CB9}" v="70" dt="2024-04-04T03:12:42.181"/>
-    <p1510:client id="{8CFE72A8-1333-8CBD-4F5F-C5A24F8478BE}" v="221" dt="2024-04-04T12:09:23.630"/>
-    <p1510:client id="{90019EB4-F821-A29C-DA73-B4925224C017}" v="87" dt="2024-04-03T22:23:51.466"/>
-    <p1510:client id="{9A0A7349-5444-9A72-39AC-D295A35ABBA3}" v="2564" dt="2024-04-04T17:45:41.351"/>
-    <p1510:client id="{BF02C284-D9F8-48C4-B5E9-2F8F6E2E0970}" v="4" dt="2024-04-04T03:10:06.228"/>
-    <p1510:client id="{CAD8FCDA-ED1D-0DED-1336-D895A2C939C6}" v="92" dt="2024-04-04T03:45:50.371"/>
-    <p1510:client id="{D947CACD-6E44-2493-3EF3-CC6AFBFFF798}" v="370" dt="2024-04-04T17:51:31.325"/>
+    <p1510:client id="{414E3675-4F2A-1EB1-9C27-6EF5998E37AD}" v="238" dt="2024-04-11T03:38:48.004"/>
+    <p1510:client id="{9962945A-8199-EEE8-8AA0-84E83973D870}" v="164" dt="2024-04-11T17:33:45.364"/>
   </p1510:revLst>
 </p1510:revInfo>
 </file>
@@ -218,7 +205,7 @@
           </a:lstStyle>
           <a:p>
             <a:fld id="{964C9F2C-9F9D-464F-904D-D5E127A8FBC9}" type="datetimeFigureOut">
-              <a:t>4/4/2024</a:t>
+              <a:t>4/11/2024</a:t>
             </a:fld>
             <a:endParaRPr lang="en-US"/>
           </a:p>
@@ -702,7 +689,7 @@
           <a:p>
             <a:fld id="{41C03D7F-B796-4B92-B0C7-6D4C9CC8C787}" type="datetimeFigureOut">
               <a:rPr lang="en-US" smtClean="0"/>
-              <a:t>4/4/2024</a:t>
+              <a:t>4/11/2024</a:t>
             </a:fld>
             <a:endParaRPr lang="en-US"/>
           </a:p>
@@ -870,7 +857,7 @@
           <a:p>
             <a:fld id="{41C03D7F-B796-4B92-B0C7-6D4C9CC8C787}" type="datetimeFigureOut">
               <a:rPr lang="en-US" smtClean="0"/>
-              <a:t>4/4/2024</a:t>
+              <a:t>4/11/2024</a:t>
             </a:fld>
             <a:endParaRPr lang="en-US"/>
           </a:p>
@@ -1048,7 +1035,7 @@
           <a:p>
             <a:fld id="{41C03D7F-B796-4B92-B0C7-6D4C9CC8C787}" type="datetimeFigureOut">
               <a:rPr lang="en-US" smtClean="0"/>
-              <a:t>4/4/2024</a:t>
+              <a:t>4/11/2024</a:t>
             </a:fld>
             <a:endParaRPr lang="en-US"/>
           </a:p>
@@ -1216,7 +1203,7 @@
           <a:p>
             <a:fld id="{41C03D7F-B796-4B92-B0C7-6D4C9CC8C787}" type="datetimeFigureOut">
               <a:rPr lang="en-US" smtClean="0"/>
-              <a:t>4/4/2024</a:t>
+              <a:t>4/11/2024</a:t>
             </a:fld>
             <a:endParaRPr lang="en-US"/>
           </a:p>
@@ -1459,7 +1446,7 @@
           <a:p>
             <a:fld id="{41C03D7F-B796-4B92-B0C7-6D4C9CC8C787}" type="datetimeFigureOut">
               <a:rPr lang="en-US" smtClean="0"/>
-              <a:t>4/4/2024</a:t>
+              <a:t>4/11/2024</a:t>
             </a:fld>
             <a:endParaRPr lang="en-US"/>
           </a:p>
@@ -1688,7 +1675,7 @@
           <a:p>
             <a:fld id="{41C03D7F-B796-4B92-B0C7-6D4C9CC8C787}" type="datetimeFigureOut">
               <a:rPr lang="en-US" smtClean="0"/>
-              <a:t>4/4/2024</a:t>
+              <a:t>4/11/2024</a:t>
             </a:fld>
             <a:endParaRPr lang="en-US"/>
           </a:p>
@@ -2052,7 +2039,7 @@
           <a:p>
             <a:fld id="{41C03D7F-B796-4B92-B0C7-6D4C9CC8C787}" type="datetimeFigureOut">
               <a:rPr lang="en-US" smtClean="0"/>
-              <a:t>4/4/2024</a:t>
+              <a:t>4/11/2024</a:t>
             </a:fld>
             <a:endParaRPr lang="en-US"/>
           </a:p>
@@ -2169,7 +2156,7 @@
           <a:p>
             <a:fld id="{41C03D7F-B796-4B92-B0C7-6D4C9CC8C787}" type="datetimeFigureOut">
               <a:rPr lang="en-US" smtClean="0"/>
-              <a:t>4/4/2024</a:t>
+              <a:t>4/11/2024</a:t>
             </a:fld>
             <a:endParaRPr lang="en-US"/>
           </a:p>
@@ -2264,7 +2251,7 @@
           <a:p>
             <a:fld id="{41C03D7F-B796-4B92-B0C7-6D4C9CC8C787}" type="datetimeFigureOut">
               <a:rPr lang="en-US" smtClean="0"/>
-              <a:t>4/4/2024</a:t>
+              <a:t>4/11/2024</a:t>
             </a:fld>
             <a:endParaRPr lang="en-US"/>
           </a:p>
@@ -2539,7 +2526,7 @@
           <a:p>
             <a:fld id="{41C03D7F-B796-4B92-B0C7-6D4C9CC8C787}" type="datetimeFigureOut">
               <a:rPr lang="en-US" smtClean="0"/>
-              <a:t>4/4/2024</a:t>
+              <a:t>4/11/2024</a:t>
             </a:fld>
             <a:endParaRPr lang="en-US"/>
           </a:p>
@@ -2794,7 +2781,7 @@
           <a:p>
             <a:fld id="{41C03D7F-B796-4B92-B0C7-6D4C9CC8C787}" type="datetimeFigureOut">
               <a:rPr lang="en-US" smtClean="0"/>
-              <a:t>4/4/2024</a:t>
+              <a:t>4/11/2024</a:t>
             </a:fld>
             <a:endParaRPr lang="en-US"/>
           </a:p>
@@ -3005,7 +2992,7 @@
           <a:p>
             <a:fld id="{41C03D7F-B796-4B92-B0C7-6D4C9CC8C787}" type="datetimeFigureOut">
               <a:rPr lang="en-US" smtClean="0"/>
-              <a:t>4/4/2024</a:t>
+              <a:t>4/11/2024</a:t>
             </a:fld>
             <a:endParaRPr lang="en-US"/>
           </a:p>
@@ -3410,6 +3397,66 @@
           <a:chExt cx="0" cy="0"/>
         </a:xfrm>
       </p:grpSpPr>
+      <p:pic>
+        <p:nvPicPr>
+          <p:cNvPr id="2" name="Picture 1" descr="A close up of a crochet blanket&#10;&#10;Description automatically generated">
+            <a:extLst>
+              <a:ext uri="{FF2B5EF4-FFF2-40B4-BE49-F238E27FC236}">
+                <a16:creationId xmlns:a16="http://schemas.microsoft.com/office/drawing/2014/main" id="{0974235C-9770-45DA-208F-8A4B6C97D3B9}"/>
+              </a:ext>
+            </a:extLst>
+          </p:cNvPr>
+          <p:cNvPicPr>
+            <a:picLocks noChangeAspect="1"/>
+          </p:cNvPicPr>
+          <p:nvPr/>
+        </p:nvPicPr>
+        <p:blipFill>
+          <a:blip r:embed="rId3"/>
+          <a:stretch>
+            <a:fillRect/>
+          </a:stretch>
+        </p:blipFill>
+        <p:spPr>
+          <a:xfrm>
+            <a:off x="19440291" y="22345057"/>
+            <a:ext cx="8552053" cy="13258761"/>
+          </a:xfrm>
+          <a:prstGeom prst="rect">
+            <a:avLst/>
+          </a:prstGeom>
+        </p:spPr>
+      </p:pic>
+      <p:pic>
+        <p:nvPicPr>
+          <p:cNvPr id="10" name="Picture 9">
+            <a:extLst>
+              <a:ext uri="{FF2B5EF4-FFF2-40B4-BE49-F238E27FC236}">
+                <a16:creationId xmlns:a16="http://schemas.microsoft.com/office/drawing/2014/main" id="{B89D5C7B-6783-E75C-8761-C98568E7328C}"/>
+              </a:ext>
+            </a:extLst>
+          </p:cNvPr>
+          <p:cNvPicPr>
+            <a:picLocks noChangeAspect="1"/>
+          </p:cNvPicPr>
+          <p:nvPr/>
+        </p:nvPicPr>
+        <p:blipFill>
+          <a:blip r:embed="rId4"/>
+          <a:stretch>
+            <a:fillRect/>
+          </a:stretch>
+        </p:blipFill>
+        <p:spPr>
+          <a:xfrm>
+            <a:off x="28512570" y="6991449"/>
+            <a:ext cx="8493307" cy="12413157"/>
+          </a:xfrm>
+          <a:prstGeom prst="rect">
+            <a:avLst/>
+          </a:prstGeom>
+        </p:spPr>
+      </p:pic>
       <p:sp>
         <p:nvSpPr>
           <p:cNvPr id="16" name="TextBox 15"/>
@@ -3451,14 +3498,10 @@
             <a:pPr algn="just"/>
             <a:r>
               <a:rPr lang="en-US" sz="3200"/>
-              <a:t> </a:t>
-            </a:r>
-            <a:r>
-              <a:rPr lang="en-US" sz="3200" dirty="0"/>
-              <a:t>HobbyPro</a:t>
-            </a:r>
-            <a:r>
-              <a:rPr lang="en-US" sz="3200" dirty="0">
+              <a:t> HobbyPro</a:t>
+            </a:r>
+            <a:r>
+              <a:rPr lang="en-US" sz="3200">
                 <a:latin typeface="Calibri"/>
                 <a:ea typeface="Calibri"/>
                 <a:cs typeface="Calibri"/>
@@ -3466,7 +3509,7 @@
               <a:t> is a web-based, mobile-friendly project management application created for individual hobbyists. Core features include an intuitive interface to manage multiple projects within one repository</a:t>
             </a:r>
             <a:r>
-              <a:rPr lang="en-US" sz="3200" dirty="0"/>
+              <a:rPr lang="en-US" sz="3200"/>
               <a:t>. Hobbyists can create projects and add as many “stages” to break down projects into manageable work. This allows hobbyists to tailor each project to their individual needs easily. To further promote the idea of tailoring each project, hobbyists can set deadlines within their projects and track the time spent. Within each stage, hobbyists can add tasks to a kanban board to help visualize work and maximize efficiency. Notes, documents, and images can be added as needed to the project or individually in a library to serve as inspiration for future projects. Utilizing visualization tools, Hobby Pro displays a progress bar for each project to identify how far along a project has been completed. Hobby Pro’s goal is to streamline tracking and project organization by providing a centralized space for users to manage all aspects of their hobbies efficiently.</a:t>
             </a:r>
           </a:p>
@@ -3697,7 +3740,7 @@
           <p:nvPr/>
         </p:nvPicPr>
         <p:blipFill>
-          <a:blip r:embed="rId3" cstate="print">
+          <a:blip r:embed="rId5" cstate="print">
             <a:extLst>
               <a:ext uri="{28A0092B-C50C-407E-A947-70E740481C1C}">
                 <a14:useLocalDpi xmlns:a14="http://schemas.microsoft.com/office/drawing/2010/main" val="0"/>
@@ -3732,12 +3775,15 @@
         </p:nvSpPr>
         <p:spPr>
           <a:xfrm>
-            <a:off x="1631826" y="28653225"/>
-            <a:ext cx="17201113" cy="6986528"/>
+            <a:off x="1563490" y="28516554"/>
+            <a:ext cx="17262615" cy="7478970"/>
           </a:xfrm>
           <a:prstGeom prst="rect">
             <a:avLst/>
           </a:prstGeom>
+          <a:solidFill>
+            <a:schemeClr val="bg1"/>
+          </a:solidFill>
           <a:ln>
             <a:noFill/>
           </a:ln>
@@ -3764,52 +3810,73 @@
           <a:p>
             <a:pPr algn="just"/>
             <a:r>
-              <a:rPr lang="en-US" sz="3200" b="1" err="1">
+              <a:rPr lang="en-US" sz="3200" dirty="0">
+                <a:ea typeface="Calibri"/>
+                <a:cs typeface="Calibri"/>
+              </a:rPr>
+              <a:t>We used the following technologies for our project: </a:t>
+            </a:r>
+            <a:endParaRPr lang="en-US"/>
+          </a:p>
+          <a:p>
+            <a:pPr marL="457200" indent="-457200" algn="just">
+              <a:buFont typeface="Arial"/>
+              <a:buChar char="•"/>
+            </a:pPr>
+            <a:r>
+              <a:rPr lang="en-US" sz="3200" b="1" dirty="0" err="1">
                 <a:ea typeface="Calibri"/>
                 <a:cs typeface="Calibri"/>
               </a:rPr>
               <a:t>HyperText</a:t>
             </a:r>
             <a:r>
-              <a:rPr lang="en-US" sz="3200" b="1">
+              <a:rPr lang="en-US" sz="3200" b="1" dirty="0">
                 <a:ea typeface="Calibri"/>
                 <a:cs typeface="Calibri"/>
               </a:rPr>
               <a:t> </a:t>
             </a:r>
             <a:r>
-              <a:rPr lang="en-US" sz="3200" b="1" err="1">
+              <a:rPr lang="en-US" sz="3200" b="1" dirty="0" err="1">
                 <a:ea typeface="Calibri"/>
                 <a:cs typeface="Calibri"/>
               </a:rPr>
               <a:t>MarkUp</a:t>
             </a:r>
             <a:r>
-              <a:rPr lang="en-US" sz="3200" b="1">
+              <a:rPr lang="en-US" sz="3200" b="1" dirty="0">
                 <a:ea typeface="Calibri"/>
                 <a:cs typeface="Calibri"/>
               </a:rPr>
               <a:t> Language (HTML):  </a:t>
             </a:r>
             <a:r>
-              <a:rPr lang="en-US" sz="3200">
+              <a:rPr lang="en-US" sz="3200" dirty="0">
                 <a:ea typeface="Calibri"/>
                 <a:cs typeface="Calibri"/>
               </a:rPr>
               <a:t>The standard mark-up language used to define the structure of a webpage.</a:t>
             </a:r>
-          </a:p>
-          <a:p>
-            <a:pPr algn="just"/>
-            <a:r>
-              <a:rPr lang="en-US" sz="3200" b="1">
+            <a:endParaRPr lang="en-US" dirty="0">
+              <a:ea typeface="Calibri" panose="020F0502020204030204"/>
+              <a:cs typeface="Calibri" panose="020F0502020204030204"/>
+            </a:endParaRPr>
+          </a:p>
+          <a:p>
+            <a:pPr marL="457200" indent="-457200" algn="just">
+              <a:buFont typeface="Arial"/>
+              <a:buChar char="•"/>
+            </a:pPr>
+            <a:r>
+              <a:rPr lang="en-US" sz="3200" b="1" dirty="0">
                 <a:ea typeface="Calibri"/>
                 <a:cs typeface="Calibri"/>
               </a:rPr>
               <a:t>Cascading Style Sheets (CSS):</a:t>
             </a:r>
             <a:r>
-              <a:rPr lang="en-US" sz="3200">
+              <a:rPr lang="en-US" sz="3200" dirty="0">
                 <a:ea typeface="Calibri"/>
                 <a:cs typeface="Calibri"/>
               </a:rPr>
@@ -3817,34 +3884,43 @@
             </a:r>
           </a:p>
           <a:p>
-            <a:pPr algn="just"/>
-            <a:r>
-              <a:rPr lang="en-US" sz="3200" b="1">
+            <a:pPr marL="457200" indent="-457200" algn="just">
+              <a:buFont typeface="Arial"/>
+              <a:buChar char="•"/>
+            </a:pPr>
+            <a:r>
+              <a:rPr lang="en-US" sz="3200" b="1" dirty="0">
                 <a:ea typeface="Calibri"/>
                 <a:cs typeface="Calibri"/>
               </a:rPr>
-              <a:t>Vue.JS: </a:t>
-            </a:r>
-            <a:r>
-              <a:rPr lang="en-US" sz="3200">
+              <a:t>Vue.js: </a:t>
+            </a:r>
+            <a:r>
+              <a:rPr lang="en-US" sz="3200" dirty="0">
                 <a:ea typeface="Calibri"/>
                 <a:cs typeface="Calibri"/>
               </a:rPr>
               <a:t>A JavaScript framework that offers a component-based programming model which allows developers to build complex user interfaces.</a:t>
             </a:r>
-            <a:endParaRPr lang="en-US"/>
-          </a:p>
-          <a:p>
-            <a:pPr algn="just"/>
-            <a:r>
-              <a:rPr lang="en-US" sz="3200" b="1">
+            <a:endParaRPr lang="en-US" dirty="0">
+              <a:ea typeface="Calibri" panose="020F0502020204030204"/>
+              <a:cs typeface="Calibri" panose="020F0502020204030204"/>
+            </a:endParaRPr>
+          </a:p>
+          <a:p>
+            <a:pPr marL="457200" indent="-457200" algn="just">
+              <a:buFont typeface="Arial"/>
+              <a:buChar char="•"/>
+            </a:pPr>
+            <a:r>
+              <a:rPr lang="en-US" sz="3200" b="1" dirty="0">
                 <a:ea typeface="Calibri"/>
                 <a:cs typeface="Calibri"/>
               </a:rPr>
               <a:t>Bootstrap:  </a:t>
             </a:r>
             <a:r>
-              <a:rPr lang="en-US" sz="3200">
+              <a:rPr lang="en-US" sz="3200" dirty="0">
                 <a:ea typeface="Calibri"/>
                 <a:cs typeface="Calibri"/>
               </a:rPr>
@@ -3852,16 +3928,19 @@
             </a:r>
           </a:p>
           <a:p>
-            <a:pPr algn="just"/>
-            <a:r>
-              <a:rPr lang="en-US" sz="3200" b="1">
+            <a:pPr marL="457200" indent="-457200" algn="just">
+              <a:buFont typeface="Arial"/>
+              <a:buChar char="•"/>
+            </a:pPr>
+            <a:r>
+              <a:rPr lang="en-US" sz="3200" b="1" dirty="0">
                 <a:ea typeface="Calibri"/>
                 <a:cs typeface="Calibri"/>
               </a:rPr>
               <a:t>Firebase Authentication:  </a:t>
             </a:r>
             <a:r>
-              <a:rPr lang="en-US" sz="3200">
+              <a:rPr lang="en-US" sz="3200" dirty="0">
                 <a:ea typeface="Calibri"/>
                 <a:cs typeface="Calibri"/>
               </a:rPr>
@@ -3869,16 +3948,33 @@
             </a:r>
           </a:p>
           <a:p>
-            <a:pPr algn="just"/>
-            <a:r>
-              <a:rPr lang="en-US" sz="3200" b="1">
+            <a:pPr marL="457200" indent="-457200" algn="just">
+              <a:buFont typeface="Arial"/>
+              <a:buChar char="•"/>
+            </a:pPr>
+            <a:r>
+              <a:rPr lang="en-US" sz="3200" b="1" dirty="0">
                 <a:ea typeface="Calibri"/>
                 <a:cs typeface="Calibri"/>
               </a:rPr>
-              <a:t>Firebase FireStore: </a:t>
-            </a:r>
-            <a:r>
-              <a:rPr lang="en-US" sz="3200">
+              <a:t>Firebase </a:t>
+            </a:r>
+            <a:r>
+              <a:rPr lang="en-US" sz="3200" b="1" dirty="0" err="1">
+                <a:ea typeface="Calibri"/>
+                <a:cs typeface="Calibri"/>
+              </a:rPr>
+              <a:t>FireStore</a:t>
+            </a:r>
+            <a:r>
+              <a:rPr lang="en-US" sz="3200" b="1" dirty="0">
+                <a:ea typeface="Calibri"/>
+                <a:cs typeface="Calibri"/>
+              </a:rPr>
+              <a:t>: </a:t>
+            </a:r>
+            <a:r>
+              <a:rPr lang="en-US" sz="3200" dirty="0">
                 <a:ea typeface="Calibri"/>
                 <a:cs typeface="Calibri"/>
               </a:rPr>
@@ -3886,16 +3982,19 @@
             </a:r>
           </a:p>
           <a:p>
-            <a:pPr algn="just"/>
-            <a:r>
-              <a:rPr lang="en-US" sz="3200" b="1">
+            <a:pPr marL="457200" indent="-457200" algn="just">
+              <a:buFont typeface="Arial"/>
+              <a:buChar char="•"/>
+            </a:pPr>
+            <a:r>
+              <a:rPr lang="en-US" sz="3200" b="1" dirty="0">
                 <a:ea typeface="Calibri"/>
                 <a:cs typeface="Calibri"/>
               </a:rPr>
               <a:t>Firebase Cloud Storage:</a:t>
             </a:r>
             <a:r>
-              <a:rPr lang="en-US" sz="3200">
+              <a:rPr lang="en-US" sz="3200" dirty="0">
                 <a:ea typeface="Calibri"/>
                 <a:cs typeface="Calibri"/>
               </a:rPr>
@@ -3918,7 +4017,7 @@
         </p:nvSpPr>
         <p:spPr>
           <a:xfrm>
-            <a:off x="1216571" y="27803668"/>
+            <a:off x="1216571" y="27666996"/>
             <a:ext cx="17425328" cy="830997"/>
           </a:xfrm>
           <a:prstGeom prst="rect">
@@ -3978,7 +4077,7 @@
         <p:spPr>
           <a:xfrm>
             <a:off x="19570112" y="7315200"/>
-            <a:ext cx="8297838" cy="11418510"/>
+            <a:ext cx="8291395" cy="14865608"/>
           </a:xfrm>
           <a:prstGeom prst="rect">
             <a:avLst/>
@@ -4010,18 +4109,43 @@
             <a:pPr algn="just"/>
             <a:r>
               <a:rPr lang="en-US" sz="3200" dirty="0"/>
-              <a:t> The design layout underwent several iterations before ultimately adopting a dashboard view, which aligned with our requirements and provided the most comprehensive data visualization. Our project icon is a straightforward card layout containing essential project information such as the project’s name, start date, last update date, and deadline if added with days left. Hobbyists can categorize their projects by adding tag names to their projects which in turn were added to the icon. Additionally, a progress bar was included in the project icon to help visualize project progress. We set out to develop </a:t>
-            </a:r>
-            <a:r>
-              <a:rPr lang="en-US" sz="3200" err="1"/>
+              <a:t> We set out to develop </a:t>
+            </a:r>
+            <a:r>
+              <a:rPr lang="en-US" sz="3200" dirty="0" err="1"/>
               <a:t>HobbyPro</a:t>
             </a:r>
             <a:r>
               <a:rPr lang="en-US" sz="3200" dirty="0"/>
-              <a:t> as a flexible project management tool that can be used for any hobby. As a result, we focused on keeping the design of the Project’s Page simple, incorporating common tools like note-taking and image uploading. Additionally, we included a kanban board to help users visualize work and organize tasks. All of these features are accessible within each “stage”, which users can add or remove as needed.</a:t>
-            </a:r>
-            <a:endParaRPr lang="en-US" dirty="0">
-              <a:cs typeface="Calibri" panose="020F0502020204030204"/>
+              <a:t> as a flexible project management tool that can be used for any hobby. Thus, the design of </a:t>
+            </a:r>
+            <a:r>
+              <a:rPr lang="en-US" sz="3200" dirty="0" err="1"/>
+              <a:t>HobbyPro</a:t>
+            </a:r>
+            <a:r>
+              <a:rPr lang="en-US" sz="3200" dirty="0"/>
+              <a:t> underwent several iterations before ultimately adopting a dashboard view as it aligned with our initial requirements and provided the most comprehensive data visualization. </a:t>
+            </a:r>
+            <a:endParaRPr lang="en-US" dirty="0"/>
+          </a:p>
+          <a:p>
+            <a:pPr algn="just"/>
+            <a:r>
+              <a:rPr lang="en-US" sz="3200" dirty="0"/>
+              <a:t> We wanted our project icon to be a straightforward card layout containing essential project information such as the project’s name, start date, last update date, and deadline (and if included the number of days left). Additionally, a progress bar was included in the project icon to help users visualize project progress. As for the “stages”, we wanted what we considered the top three essential features, to add tasks, notes, and images in a simple easy-to-use layout.  The best approach in our eyes was to add a kanban board for organizing tasks, and a text area for notes in each stage, while leaving images as an optional add-on. Once again, the dashboard view was instrumental in visualizing the work and progress of the overall project. The dashboard view also gave us the opportunity in terms of space to add buttons for adding time spent working on the project as well as changing the settings of the project. As for other aspects of the project, the design of it began to make sense as we worked on the design requirements of </a:t>
+            </a:r>
+            <a:r>
+              <a:rPr lang="en-US" sz="3200" dirty="0" err="1"/>
+              <a:t>HobbyPro</a:t>
+            </a:r>
+            <a:r>
+              <a:rPr lang="en-US" sz="3200" dirty="0"/>
+              <a:t>. </a:t>
+            </a:r>
+            <a:endParaRPr lang="en-US" sz="3200">
+              <a:ea typeface="Calibri"/>
+              <a:cs typeface="Calibri"/>
             </a:endParaRPr>
           </a:p>
         </p:txBody>
@@ -4087,10 +4211,10 @@
       </p:sp>
       <p:sp>
         <p:nvSpPr>
-          <p:cNvPr id="54" name="TextBox 53">
+          <p:cNvPr id="71" name="TextBox 70">
             <a:extLst>
               <a:ext uri="{FF2B5EF4-FFF2-40B4-BE49-F238E27FC236}">
-                <a16:creationId xmlns:a16="http://schemas.microsoft.com/office/drawing/2014/main" id="{D25BFCBA-8F53-DD46-A2ED-0F4416500F31}"/>
+                <a16:creationId xmlns:a16="http://schemas.microsoft.com/office/drawing/2014/main" id="{91F0780E-0709-FD48-B93E-B99DCFE28DBE}"/>
               </a:ext>
             </a:extLst>
           </p:cNvPr>
@@ -4099,8 +4223,8 @@
         </p:nvSpPr>
         <p:spPr>
           <a:xfrm>
-            <a:off x="28737704" y="7346960"/>
-            <a:ext cx="8366174" cy="5509200"/>
+            <a:off x="29011048" y="28505504"/>
+            <a:ext cx="8158823" cy="2062103"/>
           </a:xfrm>
           <a:prstGeom prst="rect">
             <a:avLst/>
@@ -4129,67 +4253,179 @@
           </a:bodyPr>
           <a:lstStyle/>
           <a:p>
+            <a:pPr marL="514350" indent="-514350" algn="just">
+              <a:buAutoNum type="arabicPeriod"/>
+            </a:pPr>
+            <a:r>
+              <a:rPr lang="en-US" sz="3200" dirty="0">
+                <a:ea typeface="+mn-lt"/>
+                <a:cs typeface="+mn-lt"/>
+              </a:rPr>
+              <a:t>W3Schools</a:t>
+            </a:r>
+            <a:r>
+              <a:rPr lang="en-US" sz="3200" dirty="0">
+                <a:cs typeface="Calibri"/>
+              </a:rPr>
+              <a:t> https://www.w3schools.com/</a:t>
+            </a:r>
+          </a:p>
+          <a:p>
+            <a:pPr marL="514350" indent="-514350" algn="just">
+              <a:buAutoNum type="arabicPeriod"/>
+            </a:pPr>
+            <a:r>
+              <a:rPr lang="en-US" sz="3200" dirty="0">
+                <a:ea typeface="+mn-lt"/>
+                <a:cs typeface="+mn-lt"/>
+              </a:rPr>
+              <a:t>Vue.js https://vuejs.org/</a:t>
+            </a:r>
+          </a:p>
+          <a:p>
+            <a:pPr marL="514350" indent="-514350" algn="just">
+              <a:buAutoNum type="arabicPeriod"/>
+            </a:pPr>
+            <a:r>
+              <a:rPr lang="en-US" sz="3200" dirty="0" err="1">
+                <a:ea typeface="Calibri" panose="020F0502020204030204"/>
+                <a:cs typeface="Calibri" panose="020F0502020204030204"/>
+              </a:rPr>
+              <a:t>Bootstap</a:t>
+            </a:r>
+            <a:r>
+              <a:rPr lang="en-US" sz="3200" dirty="0">
+                <a:ea typeface="Calibri" panose="020F0502020204030204"/>
+                <a:cs typeface="Calibri" panose="020F0502020204030204"/>
+              </a:rPr>
+              <a:t> https://getbootstrap.com/</a:t>
+            </a:r>
+            <a:endParaRPr lang="en-US" sz="3200" dirty="0">
+              <a:cs typeface="Calibri" panose="020F0502020204030204"/>
+            </a:endParaRPr>
+          </a:p>
+          <a:p>
+            <a:pPr marL="514350" indent="-514350" algn="just">
+              <a:buAutoNum type="arabicPeriod"/>
+            </a:pPr>
+            <a:r>
+              <a:rPr lang="en-US" sz="3200">
+                <a:ea typeface="+mn-lt"/>
+                <a:cs typeface="+mn-lt"/>
+              </a:rPr>
+              <a:t>Firebase https://firebase.google.com/</a:t>
+            </a:r>
+          </a:p>
+        </p:txBody>
+      </p:sp>
+      <p:sp>
+        <p:nvSpPr>
+          <p:cNvPr id="54" name="TextBox 53">
+            <a:extLst>
+              <a:ext uri="{FF2B5EF4-FFF2-40B4-BE49-F238E27FC236}">
+                <a16:creationId xmlns:a16="http://schemas.microsoft.com/office/drawing/2014/main" id="{D25BFCBA-8F53-DD46-A2ED-0F4416500F31}"/>
+              </a:ext>
+            </a:extLst>
+          </p:cNvPr>
+          <p:cNvSpPr txBox="1"/>
+          <p:nvPr/>
+        </p:nvSpPr>
+        <p:spPr>
+          <a:xfrm>
+            <a:off x="28682366" y="22308667"/>
+            <a:ext cx="8366174" cy="5509200"/>
+          </a:xfrm>
+          <a:prstGeom prst="rect">
+            <a:avLst/>
+          </a:prstGeom>
+          <a:solidFill>
+            <a:schemeClr val="bg1"/>
+          </a:solidFill>
+          <a:ln>
+            <a:noFill/>
+          </a:ln>
+        </p:spPr>
+        <p:style>
+          <a:lnRef idx="2">
+            <a:schemeClr val="dk1"/>
+          </a:lnRef>
+          <a:fillRef idx="1">
+            <a:schemeClr val="lt1"/>
+          </a:fillRef>
+          <a:effectRef idx="0">
+            <a:schemeClr val="dk1"/>
+          </a:effectRef>
+          <a:fontRef idx="minor">
+            <a:schemeClr val="dk1"/>
+          </a:fontRef>
+        </p:style>
+        <p:txBody>
+          <a:bodyPr wrap="square" lIns="91440" tIns="45720" rIns="91440" bIns="45720" rtlCol="0" anchor="t">
+            <a:spAutoFit/>
+          </a:bodyPr>
+          <a:lstStyle/>
+          <a:p>
             <a:pPr algn="just"/>
             <a:r>
-              <a:rPr lang="en-US" sz="3200" dirty="0"/>
+              <a:rPr lang="en-US" sz="3200"/>
               <a:t> The </a:t>
             </a:r>
             <a:r>
-              <a:rPr lang="en-US" sz="3200" dirty="0" err="1"/>
+              <a:rPr lang="en-US" sz="3200" err="1"/>
               <a:t>HobbyPro</a:t>
             </a:r>
             <a:r>
-              <a:rPr lang="en-US" sz="3200" dirty="0"/>
+              <a:rPr lang="en-US" sz="3200"/>
               <a:t> team hopes to enhance our website by implementing a community support feature that enables users to share and view other user projects. This will provide users</a:t>
             </a:r>
             <a:r>
-              <a:rPr lang="en-US" sz="3200" dirty="0">
+              <a:rPr lang="en-US" sz="3200">
                 <a:ea typeface="Calibri"/>
                 <a:cs typeface="Calibri"/>
               </a:rPr>
               <a:t> with </a:t>
             </a:r>
             <a:r>
-              <a:rPr lang="en-US" sz="3200" dirty="0"/>
+              <a:rPr lang="en-US" sz="3200"/>
               <a:t>inspiration for their next big project, as well as</a:t>
             </a:r>
             <a:r>
-              <a:rPr lang="en-US" sz="3200" dirty="0">
+              <a:rPr lang="en-US" sz="3200">
                 <a:ea typeface="Calibri"/>
                 <a:cs typeface="Calibri"/>
               </a:rPr>
               <a:t> </a:t>
             </a:r>
             <a:r>
-              <a:rPr lang="en-US" sz="3200" dirty="0"/>
+              <a:rPr lang="en-US" sz="3200"/>
               <a:t>the ability to rate and download projects from the community page. Additionally, </a:t>
             </a:r>
             <a:r>
-              <a:rPr lang="en-US" sz="3200" dirty="0">
+              <a:rPr lang="en-US" sz="3200">
                 <a:ea typeface="Calibri"/>
                 <a:cs typeface="Calibri"/>
               </a:rPr>
               <a:t>we are looking to create a space for users to follow and message each other, fostering communication and collaboration within the </a:t>
             </a:r>
             <a:r>
-              <a:rPr lang="en-US" sz="3200" dirty="0" err="1">
+              <a:rPr lang="en-US" sz="3200" err="1">
                 <a:ea typeface="Calibri"/>
                 <a:cs typeface="Calibri"/>
               </a:rPr>
               <a:t>HobbyPro</a:t>
             </a:r>
             <a:r>
-              <a:rPr lang="en-US" sz="3200" dirty="0">
+              <a:rPr lang="en-US" sz="3200">
                 <a:ea typeface="Calibri"/>
                 <a:cs typeface="Calibri"/>
               </a:rPr>
               <a:t> community.</a:t>
             </a:r>
-            <a:endParaRPr lang="en-US" dirty="0"/>
+            <a:endParaRPr lang="en-US"/>
           </a:p>
           <a:p>
             <a:pPr algn="just"/>
-            <a:endParaRPr lang="en-US" sz="3200" dirty="0">
+            <a:endParaRPr lang="en-US" sz="3200">
               <a:ea typeface="Calibri"/>
               <a:cs typeface="Calibri"/>
             </a:endParaRPr>
@@ -4210,7 +4446,7 @@
         </p:nvSpPr>
         <p:spPr>
           <a:xfrm>
-            <a:off x="29216056" y="6364223"/>
+            <a:off x="29004778" y="21341594"/>
             <a:ext cx="7543800" cy="914400"/>
           </a:xfrm>
           <a:prstGeom prst="rect">
@@ -4269,7 +4505,7 @@
         </p:nvSpPr>
         <p:spPr>
           <a:xfrm>
-            <a:off x="1434699" y="22872374"/>
+            <a:off x="1434699" y="23009046"/>
             <a:ext cx="17425327" cy="830997"/>
           </a:xfrm>
           <a:prstGeom prst="rect">
@@ -4328,8 +4564,8 @@
         </p:nvSpPr>
         <p:spPr>
           <a:xfrm>
-            <a:off x="1578354" y="23928685"/>
-            <a:ext cx="17285163" cy="4031873"/>
+            <a:off x="1578354" y="23860349"/>
+            <a:ext cx="17285163" cy="3539430"/>
           </a:xfrm>
           <a:prstGeom prst="rect">
             <a:avLst/>
@@ -4360,18 +4596,21 @@
           <a:p>
             <a:pPr algn="just"/>
             <a:r>
-              <a:rPr lang="en-US" sz="3200" dirty="0"/>
-              <a:t>  </a:t>
+              <a:rPr lang="en-US" sz="3200">
+                <a:ea typeface="+mn-lt"/>
+                <a:cs typeface="+mn-lt"/>
+              </a:rPr>
+              <a:t> </a:t>
             </a:r>
             <a:r>
               <a:rPr lang="en-US" sz="3200" dirty="0">
                 <a:ea typeface="+mn-lt"/>
                 <a:cs typeface="+mn-lt"/>
               </a:rPr>
-              <a:t>In Designing </a:t>
-            </a:r>
-            <a:r>
-              <a:rPr lang="en-US" sz="3200" dirty="0" err="1">
+              <a:t>One of our team members faced a problem managing multiple projects from three different hobbies. After researching online and browsing through various forums, we realized that there is no real solution available on the market for hobbyists to organize their tasks. Most of them just settle for using notebooks or Excel spreadsheets. Some even end up using multiple software to keep track of their time and tasks. To address this issue, we decided to create an easy-to-use platform that combines all these needs in one place. This is how the idea of </a:t>
+            </a:r>
+            <a:r>
+              <a:rPr lang="en-US" sz="3200" err="1">
                 <a:ea typeface="+mn-lt"/>
                 <a:cs typeface="+mn-lt"/>
               </a:rPr>
@@ -4382,42 +4621,15 @@
                 <a:ea typeface="+mn-lt"/>
                 <a:cs typeface="+mn-lt"/>
               </a:rPr>
-              <a:t> we aimed our attention to hobbyists taking on their everyday projects they spend hours on. We are ensuring users of our software website known as </a:t>
-            </a:r>
-            <a:r>
-              <a:rPr lang="en-US" sz="3200" dirty="0" err="1">
-                <a:ea typeface="+mn-lt"/>
-                <a:cs typeface="+mn-lt"/>
-              </a:rPr>
-              <a:t>HobbyPro</a:t>
-            </a:r>
-            <a:r>
-              <a:rPr lang="en-US" sz="3200" dirty="0">
-                <a:ea typeface="+mn-lt"/>
-                <a:cs typeface="+mn-lt"/>
-              </a:rPr>
-              <a:t> an easy way to keep track of project progression and ensure you know which step of the project you are on at every stage of the project. With each project the user makes they can add stages and add tasks to each stage to ensure that each part of their project is documented so they know what to do for each task and stage they make. With </a:t>
-            </a:r>
-            <a:r>
-              <a:rPr lang="en-US" sz="3200" dirty="0" err="1">
-                <a:ea typeface="+mn-lt"/>
-                <a:cs typeface="+mn-lt"/>
-              </a:rPr>
-              <a:t>HobbyPro</a:t>
-            </a:r>
-            <a:r>
-              <a:rPr lang="en-US" sz="3200" dirty="0">
-                <a:ea typeface="+mn-lt"/>
-                <a:cs typeface="+mn-lt"/>
-              </a:rPr>
-              <a:t> we hope to reach out to hobbyist to show them an easier way to manage their projects</a:t>
-            </a:r>
+              <a:t> came into existence.</a:t>
+            </a:r>
+            <a:endParaRPr lang="en-US" dirty="0"/>
           </a:p>
           <a:p>
             <a:pPr algn="just"/>
-            <a:endParaRPr lang="en-US" sz="3200" dirty="0">
-              <a:ea typeface="Calibri"/>
-              <a:cs typeface="Calibri"/>
+            <a:endParaRPr lang="en-US" sz="3200">
+              <a:ea typeface="+mn-lt"/>
+              <a:cs typeface="+mn-lt"/>
             </a:endParaRPr>
           </a:p>
         </p:txBody>
@@ -4436,7 +4648,7 @@
         </p:nvSpPr>
         <p:spPr>
           <a:xfrm>
-            <a:off x="1495156" y="22043611"/>
+            <a:off x="1426820" y="22043611"/>
             <a:ext cx="17348264" cy="584775"/>
           </a:xfrm>
           <a:prstGeom prst="rect">
@@ -4481,7 +4693,7 @@
                   <a:schemeClr val="tx1"/>
                 </a:solidFill>
               </a:rPr>
-              <a:t>Image of the Main Dashboard</a:t>
+              <a:t>Sample Image of the Completed Project Page</a:t>
             </a:r>
             <a:endParaRPr lang="en-US" sz="3200" dirty="0">
               <a:solidFill>
@@ -4507,7 +4719,7 @@
         </p:nvSpPr>
         <p:spPr>
           <a:xfrm>
-            <a:off x="19599561" y="31090159"/>
+            <a:off x="19531225" y="35600330"/>
             <a:ext cx="8227158" cy="1077218"/>
           </a:xfrm>
           <a:prstGeom prst="rect">
@@ -4539,7 +4751,7 @@
           <a:p>
             <a:pPr algn="just"/>
             <a:r>
-              <a:rPr lang="en-US" sz="3200" b="1" dirty="0">
+              <a:rPr lang="en-US" sz="3200" b="1">
                 <a:solidFill>
                   <a:srgbClr val="BB1C3F"/>
                 </a:solidFill>
@@ -4547,14 +4759,14 @@
               <a:t>Figure 2: </a:t>
             </a:r>
             <a:r>
-              <a:rPr lang="en-US" sz="3200" dirty="0">
+              <a:rPr lang="en-US" sz="3200">
                 <a:solidFill>
                   <a:srgbClr val="000000"/>
                 </a:solidFill>
               </a:rPr>
               <a:t>Project Icon that appears on the Main Dashboard  </a:t>
             </a:r>
-            <a:endParaRPr lang="en-US" sz="3200" dirty="0">
+            <a:endParaRPr lang="en-US" sz="3200">
               <a:cs typeface="Calibri"/>
             </a:endParaRPr>
           </a:p>
@@ -4574,7 +4786,7 @@
         </p:nvSpPr>
         <p:spPr>
           <a:xfrm>
-            <a:off x="28880706" y="25361614"/>
+            <a:off x="28648102" y="19629555"/>
             <a:ext cx="8295494" cy="1077218"/>
           </a:xfrm>
           <a:prstGeom prst="rect">
@@ -4606,7 +4818,7 @@
           <a:p>
             <a:pPr algn="just"/>
             <a:r>
-              <a:rPr lang="en-US" sz="3200" b="1" dirty="0">
+              <a:rPr lang="en-US" sz="3200" b="1">
                 <a:solidFill>
                   <a:srgbClr val="BB1C3F"/>
                 </a:solidFill>
@@ -4614,7 +4826,7 @@
               <a:t>Figure 3: </a:t>
             </a:r>
             <a:r>
-              <a:rPr lang="en-US" sz="3200" dirty="0">
+              <a:rPr lang="en-US" sz="3200">
                 <a:solidFill>
                   <a:schemeClr val="tx1"/>
                 </a:solidFill>
@@ -4622,7 +4834,7 @@
               <a:t>An </a:t>
             </a:r>
             <a:r>
-              <a:rPr lang="en-US" sz="3200" dirty="0">
+              <a:rPr lang="en-US" sz="3200">
                 <a:solidFill>
                   <a:schemeClr val="tx1"/>
                 </a:solidFill>
@@ -4630,7 +4842,7 @@
               </a:rPr>
               <a:t>example of the database schema showcasing data nesting </a:t>
             </a:r>
-            <a:endParaRPr lang="en-US" sz="3200" dirty="0">
+            <a:endParaRPr lang="en-US" sz="3200">
               <a:solidFill>
                 <a:schemeClr val="tx1"/>
               </a:solidFill>
@@ -4695,103 +4907,6 @@
                 </a:solidFill>
               </a:rPr>
               <a:t>References</a:t>
-            </a:r>
-          </a:p>
-        </p:txBody>
-      </p:sp>
-      <p:sp>
-        <p:nvSpPr>
-          <p:cNvPr id="71" name="TextBox 70">
-            <a:extLst>
-              <a:ext uri="{FF2B5EF4-FFF2-40B4-BE49-F238E27FC236}">
-                <a16:creationId xmlns:a16="http://schemas.microsoft.com/office/drawing/2014/main" id="{91F0780E-0709-FD48-B93E-B99DCFE28DBE}"/>
-              </a:ext>
-            </a:extLst>
-          </p:cNvPr>
-          <p:cNvSpPr txBox="1"/>
-          <p:nvPr/>
-        </p:nvSpPr>
-        <p:spPr>
-          <a:xfrm>
-            <a:off x="29011048" y="28505504"/>
-            <a:ext cx="8158823" cy="2062103"/>
-          </a:xfrm>
-          <a:prstGeom prst="rect">
-            <a:avLst/>
-          </a:prstGeom>
-          <a:ln>
-            <a:noFill/>
-          </a:ln>
-        </p:spPr>
-        <p:style>
-          <a:lnRef idx="2">
-            <a:schemeClr val="dk1"/>
-          </a:lnRef>
-          <a:fillRef idx="1">
-            <a:schemeClr val="lt1"/>
-          </a:fillRef>
-          <a:effectRef idx="0">
-            <a:schemeClr val="dk1"/>
-          </a:effectRef>
-          <a:fontRef idx="minor">
-            <a:schemeClr val="dk1"/>
-          </a:fontRef>
-        </p:style>
-        <p:txBody>
-          <a:bodyPr wrap="square" lIns="91440" tIns="45720" rIns="91440" bIns="45720" rtlCol="0" anchor="t">
-            <a:spAutoFit/>
-          </a:bodyPr>
-          <a:lstStyle/>
-          <a:p>
-            <a:pPr marL="514350" indent="-514350" algn="just">
-              <a:buAutoNum type="arabicPeriod"/>
-            </a:pPr>
-            <a:r>
-              <a:rPr lang="en-US" sz="3200">
-                <a:ea typeface="+mn-lt"/>
-                <a:cs typeface="+mn-lt"/>
-              </a:rPr>
-              <a:t>https://developer.mozilla.org/en-US/</a:t>
-            </a:r>
-            <a:r>
-              <a:rPr lang="en-US" sz="3200"/>
-              <a:t> </a:t>
-            </a:r>
-          </a:p>
-          <a:p>
-            <a:pPr marL="514350" indent="-514350" algn="just">
-              <a:buAutoNum type="arabicPeriod"/>
-            </a:pPr>
-            <a:r>
-              <a:rPr lang="en-US" sz="3200">
-                <a:ea typeface="+mn-lt"/>
-                <a:cs typeface="+mn-lt"/>
-              </a:rPr>
-              <a:t>https://vuejs.org/</a:t>
-            </a:r>
-          </a:p>
-          <a:p>
-            <a:pPr marL="514350" indent="-514350" algn="just">
-              <a:buAutoNum type="arabicPeriod"/>
-            </a:pPr>
-            <a:r>
-              <a:rPr lang="en-US" sz="3200">
-                <a:ea typeface="Calibri" panose="020F0502020204030204"/>
-                <a:cs typeface="Calibri" panose="020F0502020204030204"/>
-              </a:rPr>
-              <a:t>https://getboostrap.com/</a:t>
-            </a:r>
-          </a:p>
-          <a:p>
-            <a:pPr marL="514350" indent="-514350" algn="just">
-              <a:buAutoNum type="arabicPeriod"/>
-            </a:pPr>
-            <a:r>
-              <a:rPr lang="en-US" sz="3200">
-                <a:ea typeface="+mn-lt"/>
-                <a:cs typeface="+mn-lt"/>
-              </a:rPr>
-              <a:t>https://firebase.google.com/</a:t>
             </a:r>
           </a:p>
         </p:txBody>
@@ -4950,69 +5065,10 @@
       </p:cxnSp>
       <p:pic>
         <p:nvPicPr>
-          <p:cNvPr id="2" name="Picture 1" descr="A white logo with tools in the middle&#10;&#10;Description automatically generated">
+          <p:cNvPr id="5" name="Picture 4" descr="A white letter h with tools in it&#10;&#10;Description automatically generated">
             <a:extLst>
               <a:ext uri="{FF2B5EF4-FFF2-40B4-BE49-F238E27FC236}">
-                <a16:creationId xmlns:a16="http://schemas.microsoft.com/office/drawing/2014/main" id="{02CB3661-C146-FEA9-21A7-083A0B52352D}"/>
-              </a:ext>
-            </a:extLst>
-          </p:cNvPr>
-          <p:cNvPicPr>
-            <a:picLocks noChangeAspect="1"/>
-          </p:cNvPicPr>
-          <p:nvPr/>
-        </p:nvPicPr>
-        <p:blipFill>
-          <a:blip r:embed="rId4"/>
-          <a:stretch>
-            <a:fillRect/>
-          </a:stretch>
-        </p:blipFill>
-        <p:spPr>
-          <a:xfrm>
-            <a:off x="31629605" y="-866531"/>
-            <a:ext cx="6752460" cy="6919112"/>
-          </a:xfrm>
-          <a:prstGeom prst="rect">
-            <a:avLst/>
-          </a:prstGeom>
-        </p:spPr>
-      </p:pic>
-      <p:pic>
-        <p:nvPicPr>
-          <p:cNvPr id="4" name="Picture 3" descr="A quilted table runner on a green mat&#10;&#10;Description automatically generated">
-            <a:extLst>
-              <a:ext uri="{FF2B5EF4-FFF2-40B4-BE49-F238E27FC236}">
-                <a16:creationId xmlns:a16="http://schemas.microsoft.com/office/drawing/2014/main" id="{462A57C2-9E0C-9920-3932-6F166D99C367}"/>
-              </a:ext>
-            </a:extLst>
-          </p:cNvPr>
-          <p:cNvPicPr>
-            <a:picLocks noChangeAspect="1"/>
-          </p:cNvPicPr>
-          <p:nvPr/>
-        </p:nvPicPr>
-        <p:blipFill rotWithShape="1">
-          <a:blip r:embed="rId5"/>
-          <a:srcRect r="-827"/>
-          <a:stretch/>
-        </p:blipFill>
-        <p:spPr>
-          <a:xfrm>
-            <a:off x="19713451" y="19609091"/>
-            <a:ext cx="8197526" cy="11336117"/>
-          </a:xfrm>
-          <a:prstGeom prst="rect">
-            <a:avLst/>
-          </a:prstGeom>
-        </p:spPr>
-      </p:pic>
-      <p:pic>
-        <p:nvPicPr>
-          <p:cNvPr id="3" name="Picture 2" descr="A screenshot of a computer&#10;&#10;Description automatically generated">
-            <a:extLst>
-              <a:ext uri="{FF2B5EF4-FFF2-40B4-BE49-F238E27FC236}">
-                <a16:creationId xmlns:a16="http://schemas.microsoft.com/office/drawing/2014/main" id="{7C2EBC17-3D23-C412-EEBC-8E28C2D0601F}"/>
+                <a16:creationId xmlns:a16="http://schemas.microsoft.com/office/drawing/2014/main" id="{219DCB22-DFD3-B1B3-80AF-7D0B531251F6}"/>
               </a:ext>
             </a:extLst>
           </p:cNvPr>
@@ -5029,8 +5085,8 @@
         </p:blipFill>
         <p:spPr>
           <a:xfrm>
-            <a:off x="1573273" y="13669372"/>
-            <a:ext cx="17284458" cy="8168264"/>
+            <a:off x="32750913" y="-25552"/>
+            <a:ext cx="5631153" cy="5587561"/>
           </a:xfrm>
           <a:prstGeom prst="rect">
             <a:avLst/>
@@ -5039,10 +5095,10 @@
       </p:pic>
       <p:pic>
         <p:nvPicPr>
-          <p:cNvPr id="10" name="Picture 9">
+          <p:cNvPr id="6" name="Picture 5" descr="A screenshot of a project&#10;&#10;Description automatically generated">
             <a:extLst>
               <a:ext uri="{FF2B5EF4-FFF2-40B4-BE49-F238E27FC236}">
-                <a16:creationId xmlns:a16="http://schemas.microsoft.com/office/drawing/2014/main" id="{B89D5C7B-6783-E75C-8761-C98568E7328C}"/>
+                <a16:creationId xmlns:a16="http://schemas.microsoft.com/office/drawing/2014/main" id="{442AE2C4-387E-475C-941A-7C145D75F69C}"/>
               </a:ext>
             </a:extLst>
           </p:cNvPr>
@@ -5059,8 +5115,8 @@
         </p:blipFill>
         <p:spPr>
           <a:xfrm>
-            <a:off x="28679650" y="12774468"/>
-            <a:ext cx="8493307" cy="12413157"/>
+            <a:off x="1594049" y="13188702"/>
+            <a:ext cx="17244351" cy="8610600"/>
           </a:xfrm>
           <a:prstGeom prst="rect">
             <a:avLst/>

</xml_diff>